<commit_message>
determineSellPoints + half summarizeKpiResults
</commit_message>
<xml_diff>
--- a/Docs/אסטרטגיית ניהול רווח פשוטה.pptx
+++ b/Docs/אסטרטגיית ניהול רווח פשוטה.pptx
@@ -110,6 +110,11 @@
       </a:defRPr>
     </a:lvl9pPr>
   </p:defaultTextStyle>
+  <p:extLst>
+    <p:ext uri="{EFAFB233-063F-42B5-8137-9DF3F51BA10A}">
+      <p15:sldGuideLst xmlns:p15="http://schemas.microsoft.com/office/powerpoint/2012/main"/>
+    </p:ext>
+  </p:extLst>
 </p:presentation>
 </file>
 
@@ -288,7 +293,7 @@
           <a:p>
             <a:fld id="{2F5E4DF6-E865-4F3E-BD77-A07F4584DFDC}" type="datetimeFigureOut">
               <a:rPr lang="en-US" smtClean="0"/>
-              <a:t>6/3/2024</a:t>
+              <a:t>6/11/2024</a:t>
             </a:fld>
             <a:endParaRPr lang="en-US"/>
           </a:p>
@@ -486,7 +491,7 @@
           <a:p>
             <a:fld id="{2F5E4DF6-E865-4F3E-BD77-A07F4584DFDC}" type="datetimeFigureOut">
               <a:rPr lang="en-US" smtClean="0"/>
-              <a:t>6/3/2024</a:t>
+              <a:t>6/11/2024</a:t>
             </a:fld>
             <a:endParaRPr lang="en-US"/>
           </a:p>
@@ -694,7 +699,7 @@
           <a:p>
             <a:fld id="{2F5E4DF6-E865-4F3E-BD77-A07F4584DFDC}" type="datetimeFigureOut">
               <a:rPr lang="en-US" smtClean="0"/>
-              <a:t>6/3/2024</a:t>
+              <a:t>6/11/2024</a:t>
             </a:fld>
             <a:endParaRPr lang="en-US"/>
           </a:p>
@@ -892,7 +897,7 @@
           <a:p>
             <a:fld id="{2F5E4DF6-E865-4F3E-BD77-A07F4584DFDC}" type="datetimeFigureOut">
               <a:rPr lang="en-US" smtClean="0"/>
-              <a:t>6/3/2024</a:t>
+              <a:t>6/11/2024</a:t>
             </a:fld>
             <a:endParaRPr lang="en-US"/>
           </a:p>
@@ -1167,7 +1172,7 @@
           <a:p>
             <a:fld id="{2F5E4DF6-E865-4F3E-BD77-A07F4584DFDC}" type="datetimeFigureOut">
               <a:rPr lang="en-US" smtClean="0"/>
-              <a:t>6/3/2024</a:t>
+              <a:t>6/11/2024</a:t>
             </a:fld>
             <a:endParaRPr lang="en-US"/>
           </a:p>
@@ -1432,7 +1437,7 @@
           <a:p>
             <a:fld id="{2F5E4DF6-E865-4F3E-BD77-A07F4584DFDC}" type="datetimeFigureOut">
               <a:rPr lang="en-US" smtClean="0"/>
-              <a:t>6/3/2024</a:t>
+              <a:t>6/11/2024</a:t>
             </a:fld>
             <a:endParaRPr lang="en-US"/>
           </a:p>
@@ -1844,7 +1849,7 @@
           <a:p>
             <a:fld id="{2F5E4DF6-E865-4F3E-BD77-A07F4584DFDC}" type="datetimeFigureOut">
               <a:rPr lang="en-US" smtClean="0"/>
-              <a:t>6/3/2024</a:t>
+              <a:t>6/11/2024</a:t>
             </a:fld>
             <a:endParaRPr lang="en-US"/>
           </a:p>
@@ -1985,7 +1990,7 @@
           <a:p>
             <a:fld id="{2F5E4DF6-E865-4F3E-BD77-A07F4584DFDC}" type="datetimeFigureOut">
               <a:rPr lang="en-US" smtClean="0"/>
-              <a:t>6/3/2024</a:t>
+              <a:t>6/11/2024</a:t>
             </a:fld>
             <a:endParaRPr lang="en-US"/>
           </a:p>
@@ -2098,7 +2103,7 @@
           <a:p>
             <a:fld id="{2F5E4DF6-E865-4F3E-BD77-A07F4584DFDC}" type="datetimeFigureOut">
               <a:rPr lang="en-US" smtClean="0"/>
-              <a:t>6/3/2024</a:t>
+              <a:t>6/11/2024</a:t>
             </a:fld>
             <a:endParaRPr lang="en-US"/>
           </a:p>
@@ -2409,7 +2414,7 @@
           <a:p>
             <a:fld id="{2F5E4DF6-E865-4F3E-BD77-A07F4584DFDC}" type="datetimeFigureOut">
               <a:rPr lang="en-US" smtClean="0"/>
-              <a:t>6/3/2024</a:t>
+              <a:t>6/11/2024</a:t>
             </a:fld>
             <a:endParaRPr lang="en-US"/>
           </a:p>
@@ -2697,7 +2702,7 @@
           <a:p>
             <a:fld id="{2F5E4DF6-E865-4F3E-BD77-A07F4584DFDC}" type="datetimeFigureOut">
               <a:rPr lang="en-US" smtClean="0"/>
-              <a:t>6/3/2024</a:t>
+              <a:t>6/11/2024</a:t>
             </a:fld>
             <a:endParaRPr lang="en-US"/>
           </a:p>
@@ -2938,7 +2943,7 @@
           <a:p>
             <a:fld id="{2F5E4DF6-E865-4F3E-BD77-A07F4584DFDC}" type="datetimeFigureOut">
               <a:rPr lang="en-US" smtClean="0"/>
-              <a:t>6/3/2024</a:t>
+              <a:t>6/11/2024</a:t>
             </a:fld>
             <a:endParaRPr lang="en-US"/>
           </a:p>
@@ -5252,8 +5257,8 @@
         </p:nvSpPr>
         <p:spPr>
           <a:xfrm>
-            <a:off x="2571008" y="1081276"/>
-            <a:ext cx="6761800" cy="307777"/>
+            <a:off x="7220196" y="1081276"/>
+            <a:ext cx="2112611" cy="307777"/>
           </a:xfrm>
           <a:prstGeom prst="rect">
             <a:avLst/>
@@ -5278,8 +5283,8 @@
           </a:p>
         </p:txBody>
       </p:sp>
-      <mc:AlternateContent xmlns:mc="http://schemas.openxmlformats.org/markup-compatibility/2006">
-        <mc:Choice xmlns:p14="http://schemas.microsoft.com/office/powerpoint/2010/main" Requires="p14">
+      <mc:AlternateContent xmlns:mc="http://schemas.openxmlformats.org/markup-compatibility/2006" xmlns:p14="http://schemas.microsoft.com/office/powerpoint/2010/main">
+        <mc:Choice Requires="p14">
           <p:contentPart p14:bwMode="auto" r:id="rId3">
             <p14:nvContentPartPr>
               <p14:cNvPr id="3" name="Ink 2">
@@ -5298,7 +5303,7 @@
             </p14:xfrm>
           </p:contentPart>
         </mc:Choice>
-        <mc:Fallback>
+        <mc:Fallback xmlns="">
           <p:pic>
             <p:nvPicPr>
               <p:cNvPr id="3" name="Ink 2">
@@ -5965,6 +5970,210 @@
           <a:ln>
             <a:solidFill>
               <a:srgbClr val="FF0000"/>
+            </a:solidFill>
+          </a:ln>
+        </p:spPr>
+        <p:style>
+          <a:lnRef idx="2">
+            <a:schemeClr val="accent1">
+              <a:shade val="15000"/>
+            </a:schemeClr>
+          </a:lnRef>
+          <a:fillRef idx="1">
+            <a:schemeClr val="accent1"/>
+          </a:fillRef>
+          <a:effectRef idx="0">
+            <a:schemeClr val="accent1"/>
+          </a:effectRef>
+          <a:fontRef idx="minor">
+            <a:schemeClr val="lt1"/>
+          </a:fontRef>
+        </p:style>
+        <p:txBody>
+          <a:bodyPr rtlCol="0" anchor="ctr"/>
+          <a:lstStyle/>
+          <a:p>
+            <a:pPr algn="ctr"/>
+            <a:endParaRPr lang="en-US"/>
+          </a:p>
+        </p:txBody>
+      </p:sp>
+      <p:sp>
+        <p:nvSpPr>
+          <p:cNvPr id="4" name="TextBox 3">
+            <a:extLst>
+              <a:ext uri="{FF2B5EF4-FFF2-40B4-BE49-F238E27FC236}">
+                <a16:creationId xmlns:a16="http://schemas.microsoft.com/office/drawing/2014/main" id="{8E119542-C1DD-E2D8-A80E-3173B48D936C}"/>
+              </a:ext>
+            </a:extLst>
+          </p:cNvPr>
+          <p:cNvSpPr txBox="1"/>
+          <p:nvPr/>
+        </p:nvSpPr>
+        <p:spPr>
+          <a:xfrm>
+            <a:off x="8429969" y="3670638"/>
+            <a:ext cx="3284433" cy="954107"/>
+          </a:xfrm>
+          <a:prstGeom prst="rect">
+            <a:avLst/>
+          </a:prstGeom>
+          <a:noFill/>
+        </p:spPr>
+        <p:txBody>
+          <a:bodyPr wrap="square" rtlCol="0">
+            <a:spAutoFit/>
+          </a:bodyPr>
+          <a:lstStyle/>
+          <a:p>
+            <a:pPr algn="r" rtl="1"/>
+            <a:r>
+              <a:rPr lang="he-IL" sz="1400" b="1" dirty="0">
+                <a:solidFill>
+                  <a:srgbClr val="0070C0"/>
+                </a:solidFill>
+              </a:rPr>
+              <a:t>נ.ב.</a:t>
+            </a:r>
+          </a:p>
+          <a:p>
+            <a:pPr algn="r" rtl="1"/>
+            <a:r>
+              <a:rPr lang="he-IL" sz="1400" dirty="0">
+                <a:solidFill>
+                  <a:srgbClr val="0070C0"/>
+                </a:solidFill>
+              </a:rPr>
+              <a:t>אפשר לצאת </a:t>
+            </a:r>
+            <a:r>
+              <a:rPr lang="he-IL" sz="1400" u="sng" dirty="0">
+                <a:solidFill>
+                  <a:srgbClr val="0070C0"/>
+                </a:solidFill>
+              </a:rPr>
+              <a:t>במרוויחות ביותר</a:t>
+            </a:r>
+            <a:r>
+              <a:rPr lang="he-IL" sz="1400" dirty="0">
+                <a:solidFill>
+                  <a:srgbClr val="0070C0"/>
+                </a:solidFill>
+              </a:rPr>
+              <a:t> גם </a:t>
+            </a:r>
+            <a:r>
+              <a:rPr lang="he-IL" sz="1400" u="sng" dirty="0">
+                <a:solidFill>
+                  <a:srgbClr val="0070C0"/>
+                </a:solidFill>
+              </a:rPr>
+              <a:t>1/3 ב-</a:t>
+            </a:r>
+            <a:r>
+              <a:rPr lang="en-US" sz="1400" u="sng" dirty="0">
+                <a:solidFill>
+                  <a:srgbClr val="0070C0"/>
+                </a:solidFill>
+              </a:rPr>
+              <a:t>4.5r</a:t>
+            </a:r>
+            <a:endParaRPr lang="he-IL" sz="1400" u="sng" dirty="0">
+              <a:solidFill>
+                <a:srgbClr val="0070C0"/>
+              </a:solidFill>
+            </a:endParaRPr>
+          </a:p>
+          <a:p>
+            <a:pPr algn="r" rtl="1"/>
+            <a:r>
+              <a:rPr lang="he-IL" sz="1400" dirty="0">
+                <a:solidFill>
+                  <a:srgbClr val="0070C0"/>
+                </a:solidFill>
+              </a:rPr>
+              <a:t>ואז יוצא </a:t>
+            </a:r>
+            <a:r>
+              <a:rPr lang="he-IL" sz="1400" u="sng" dirty="0">
+                <a:solidFill>
+                  <a:srgbClr val="0070C0"/>
+                </a:solidFill>
+              </a:rPr>
+              <a:t>50% מהמרוויחות </a:t>
+            </a:r>
+            <a:r>
+              <a:rPr lang="he-IL" sz="1400" dirty="0">
+                <a:solidFill>
+                  <a:srgbClr val="0070C0"/>
+                </a:solidFill>
+              </a:rPr>
+              <a:t>יספקו כ-</a:t>
+            </a:r>
+            <a:r>
+              <a:rPr lang="en-US" sz="1400" u="sng" dirty="0">
+                <a:solidFill>
+                  <a:srgbClr val="0070C0"/>
+                </a:solidFill>
+              </a:rPr>
+              <a:t>3.5r</a:t>
+            </a:r>
+            <a:endParaRPr lang="he-IL" sz="1400" u="sng" dirty="0">
+              <a:solidFill>
+                <a:srgbClr val="0070C0"/>
+              </a:solidFill>
+            </a:endParaRPr>
+          </a:p>
+          <a:p>
+            <a:pPr algn="r" rtl="1"/>
+            <a:r>
+              <a:rPr lang="he-IL" sz="1400" b="1" dirty="0">
+                <a:solidFill>
+                  <a:srgbClr val="0070C0"/>
+                </a:solidFill>
+              </a:rPr>
+              <a:t>סה"כ רווח ממוצע במרוויחות </a:t>
+            </a:r>
+            <a:r>
+              <a:rPr lang="en-US" sz="1400" b="1" dirty="0">
+                <a:solidFill>
+                  <a:srgbClr val="0070C0"/>
+                </a:solidFill>
+              </a:rPr>
+              <a:t>3r</a:t>
+            </a:r>
+            <a:endParaRPr lang="he-IL" sz="1400" b="1" dirty="0">
+              <a:solidFill>
+                <a:srgbClr val="0070C0"/>
+              </a:solidFill>
+            </a:endParaRPr>
+          </a:p>
+        </p:txBody>
+      </p:sp>
+      <p:sp>
+        <p:nvSpPr>
+          <p:cNvPr id="6" name="Oval 5">
+            <a:extLst>
+              <a:ext uri="{FF2B5EF4-FFF2-40B4-BE49-F238E27FC236}">
+                <a16:creationId xmlns:a16="http://schemas.microsoft.com/office/drawing/2014/main" id="{0D55F0B8-6AD9-9D89-DB05-7E6738808C3B}"/>
+              </a:ext>
+            </a:extLst>
+          </p:cNvPr>
+          <p:cNvSpPr/>
+          <p:nvPr/>
+        </p:nvSpPr>
+        <p:spPr>
+          <a:xfrm>
+            <a:off x="3738280" y="5682343"/>
+            <a:ext cx="409699" cy="219693"/>
+          </a:xfrm>
+          <a:prstGeom prst="ellipse">
+            <a:avLst/>
+          </a:prstGeom>
+          <a:noFill/>
+          <a:ln w="28575">
+            <a:solidFill>
+              <a:srgbClr val="0070C0"/>
             </a:solidFill>
           </a:ln>
         </p:spPr>

</xml_diff>